<commit_message>
Updating Figure 4 to be more readable in B&W
</commit_message>
<xml_diff>
--- a/Figures.pptx
+++ b/Figures.pptx
@@ -198,7 +198,7 @@
           <a:p>
             <a:fld id="{C705CAF8-D80D-C046-8FA3-2E2BB3813305}" type="datetimeFigureOut">
               <a:rPr lang="en-US" smtClean="0"/>
-              <a:t>9/21/17</a:t>
+              <a:t>10/30/17</a:t>
             </a:fld>
             <a:endParaRPr lang="en-US"/>
           </a:p>
@@ -1280,7 +1280,7 @@
           <a:p>
             <a:fld id="{FE57C802-25A6-8F42-8D6B-8AE01C79CA6B}" type="datetimeFigureOut">
               <a:rPr lang="en-US" smtClean="0"/>
-              <a:t>9/21/17</a:t>
+              <a:t>10/30/17</a:t>
             </a:fld>
             <a:endParaRPr lang="en-US"/>
           </a:p>
@@ -1450,7 +1450,7 @@
           <a:p>
             <a:fld id="{FE57C802-25A6-8F42-8D6B-8AE01C79CA6B}" type="datetimeFigureOut">
               <a:rPr lang="en-US" smtClean="0"/>
-              <a:t>9/21/17</a:t>
+              <a:t>10/30/17</a:t>
             </a:fld>
             <a:endParaRPr lang="en-US"/>
           </a:p>
@@ -1630,7 +1630,7 @@
           <a:p>
             <a:fld id="{FE57C802-25A6-8F42-8D6B-8AE01C79CA6B}" type="datetimeFigureOut">
               <a:rPr lang="en-US" smtClean="0"/>
-              <a:t>9/21/17</a:t>
+              <a:t>10/30/17</a:t>
             </a:fld>
             <a:endParaRPr lang="en-US"/>
           </a:p>
@@ -1800,7 +1800,7 @@
           <a:p>
             <a:fld id="{FE57C802-25A6-8F42-8D6B-8AE01C79CA6B}" type="datetimeFigureOut">
               <a:rPr lang="en-US" smtClean="0"/>
-              <a:t>9/21/17</a:t>
+              <a:t>10/30/17</a:t>
             </a:fld>
             <a:endParaRPr lang="en-US"/>
           </a:p>
@@ -2046,7 +2046,7 @@
           <a:p>
             <a:fld id="{FE57C802-25A6-8F42-8D6B-8AE01C79CA6B}" type="datetimeFigureOut">
               <a:rPr lang="en-US" smtClean="0"/>
-              <a:t>9/21/17</a:t>
+              <a:t>10/30/17</a:t>
             </a:fld>
             <a:endParaRPr lang="en-US"/>
           </a:p>
@@ -2334,7 +2334,7 @@
           <a:p>
             <a:fld id="{FE57C802-25A6-8F42-8D6B-8AE01C79CA6B}" type="datetimeFigureOut">
               <a:rPr lang="en-US" smtClean="0"/>
-              <a:t>9/21/17</a:t>
+              <a:t>10/30/17</a:t>
             </a:fld>
             <a:endParaRPr lang="en-US"/>
           </a:p>
@@ -2761,7 +2761,7 @@
           <a:p>
             <a:fld id="{FE57C802-25A6-8F42-8D6B-8AE01C79CA6B}" type="datetimeFigureOut">
               <a:rPr lang="en-US" smtClean="0"/>
-              <a:t>9/21/17</a:t>
+              <a:t>10/30/17</a:t>
             </a:fld>
             <a:endParaRPr lang="en-US"/>
           </a:p>
@@ -2879,7 +2879,7 @@
           <a:p>
             <a:fld id="{FE57C802-25A6-8F42-8D6B-8AE01C79CA6B}" type="datetimeFigureOut">
               <a:rPr lang="en-US" smtClean="0"/>
-              <a:t>9/21/17</a:t>
+              <a:t>10/30/17</a:t>
             </a:fld>
             <a:endParaRPr lang="en-US"/>
           </a:p>
@@ -2974,7 +2974,7 @@
           <a:p>
             <a:fld id="{FE57C802-25A6-8F42-8D6B-8AE01C79CA6B}" type="datetimeFigureOut">
               <a:rPr lang="en-US" smtClean="0"/>
-              <a:t>9/21/17</a:t>
+              <a:t>10/30/17</a:t>
             </a:fld>
             <a:endParaRPr lang="en-US"/>
           </a:p>
@@ -3251,7 +3251,7 @@
           <a:p>
             <a:fld id="{FE57C802-25A6-8F42-8D6B-8AE01C79CA6B}" type="datetimeFigureOut">
               <a:rPr lang="en-US" smtClean="0"/>
-              <a:t>9/21/17</a:t>
+              <a:t>10/30/17</a:t>
             </a:fld>
             <a:endParaRPr lang="en-US"/>
           </a:p>
@@ -3504,7 +3504,7 @@
           <a:p>
             <a:fld id="{FE57C802-25A6-8F42-8D6B-8AE01C79CA6B}" type="datetimeFigureOut">
               <a:rPr lang="en-US" smtClean="0"/>
-              <a:t>9/21/17</a:t>
+              <a:t>10/30/17</a:t>
             </a:fld>
             <a:endParaRPr lang="en-US"/>
           </a:p>
@@ -3717,7 +3717,7 @@
           <a:p>
             <a:fld id="{FE57C802-25A6-8F42-8D6B-8AE01C79CA6B}" type="datetimeFigureOut">
               <a:rPr lang="en-US" smtClean="0"/>
-              <a:t>9/21/17</a:t>
+              <a:t>10/30/17</a:t>
             </a:fld>
             <a:endParaRPr lang="en-US"/>
           </a:p>
@@ -5597,11 +5597,11 @@
   <p:clrMapOvr>
     <a:masterClrMapping/>
   </p:clrMapOvr>
-  <mc:AlternateContent xmlns:mc="http://schemas.openxmlformats.org/markup-compatibility/2006">
-    <mc:Choice xmlns:p14="http://schemas.microsoft.com/office/powerpoint/2010/main" Requires="p14">
+  <mc:AlternateContent xmlns:mc="http://schemas.openxmlformats.org/markup-compatibility/2006" xmlns:p14="http://schemas.microsoft.com/office/powerpoint/2010/main">
+    <mc:Choice Requires="p14">
       <p:transition spd="slow" p14:dur="2000"/>
     </mc:Choice>
-    <mc:Fallback>
+    <mc:Fallback xmlns="">
       <p:transition xmlns:p14="http://schemas.microsoft.com/office/powerpoint/2010/main" spd="slow"/>
     </mc:Fallback>
   </mc:AlternateContent>
@@ -5627,7 +5627,7 @@
       </p:grpSpPr>
       <p:pic>
         <p:nvPicPr>
-          <p:cNvPr id="2" name="Picture 1"/>
+          <p:cNvPr id="18" name="Picture 17"/>
           <p:cNvPicPr>
             <a:picLocks noChangeAspect="1"/>
           </p:cNvPicPr>
@@ -5641,8 +5641,8 @@
         </p:blipFill>
         <p:spPr>
           <a:xfrm>
-            <a:off x="0" y="241300"/>
-            <a:ext cx="9144000" cy="8649623"/>
+            <a:off x="0" y="923925"/>
+            <a:ext cx="9144000" cy="7765924"/>
           </a:xfrm>
           <a:prstGeom prst="rect">
             <a:avLst/>
@@ -6133,6 +6133,150 @@
           </p:style>
         </p:cxnSp>
       </p:grpSp>
+      <p:cxnSp>
+        <p:nvCxnSpPr>
+          <p:cNvPr id="20" name="Straight Connector 19"/>
+          <p:cNvCxnSpPr/>
+          <p:nvPr/>
+        </p:nvCxnSpPr>
+        <p:spPr>
+          <a:xfrm>
+            <a:off x="7820025" y="7413625"/>
+            <a:ext cx="136525" cy="133350"/>
+          </a:xfrm>
+          <a:prstGeom prst="line">
+            <a:avLst/>
+          </a:prstGeom>
+          <a:ln w="57150" cmpd="sng">
+            <a:solidFill>
+              <a:schemeClr val="bg1"/>
+            </a:solidFill>
+          </a:ln>
+          <a:effectLst/>
+        </p:spPr>
+        <p:style>
+          <a:lnRef idx="2">
+            <a:schemeClr val="accent1"/>
+          </a:lnRef>
+          <a:fillRef idx="0">
+            <a:schemeClr val="accent1"/>
+          </a:fillRef>
+          <a:effectRef idx="1">
+            <a:schemeClr val="accent1"/>
+          </a:effectRef>
+          <a:fontRef idx="minor">
+            <a:schemeClr val="tx1"/>
+          </a:fontRef>
+        </p:style>
+      </p:cxnSp>
+      <p:cxnSp>
+        <p:nvCxnSpPr>
+          <p:cNvPr id="21" name="Straight Connector 20"/>
+          <p:cNvCxnSpPr/>
+          <p:nvPr/>
+        </p:nvCxnSpPr>
+        <p:spPr>
+          <a:xfrm>
+            <a:off x="7956550" y="7280275"/>
+            <a:ext cx="136525" cy="133350"/>
+          </a:xfrm>
+          <a:prstGeom prst="line">
+            <a:avLst/>
+          </a:prstGeom>
+          <a:ln w="57150" cmpd="sng">
+            <a:solidFill>
+              <a:schemeClr val="bg1"/>
+            </a:solidFill>
+          </a:ln>
+          <a:effectLst/>
+        </p:spPr>
+        <p:style>
+          <a:lnRef idx="2">
+            <a:schemeClr val="accent1"/>
+          </a:lnRef>
+          <a:fillRef idx="0">
+            <a:schemeClr val="accent1"/>
+          </a:fillRef>
+          <a:effectRef idx="1">
+            <a:schemeClr val="accent1"/>
+          </a:effectRef>
+          <a:fontRef idx="minor">
+            <a:schemeClr val="tx1"/>
+          </a:fontRef>
+        </p:style>
+      </p:cxnSp>
+      <p:cxnSp>
+        <p:nvCxnSpPr>
+          <p:cNvPr id="22" name="Straight Connector 21"/>
+          <p:cNvCxnSpPr/>
+          <p:nvPr/>
+        </p:nvCxnSpPr>
+        <p:spPr>
+          <a:xfrm>
+            <a:off x="8366125" y="7413625"/>
+            <a:ext cx="136525" cy="133350"/>
+          </a:xfrm>
+          <a:prstGeom prst="line">
+            <a:avLst/>
+          </a:prstGeom>
+          <a:ln w="57150" cmpd="sng">
+            <a:solidFill>
+              <a:schemeClr val="bg1"/>
+            </a:solidFill>
+          </a:ln>
+          <a:effectLst/>
+        </p:spPr>
+        <p:style>
+          <a:lnRef idx="2">
+            <a:schemeClr val="accent1"/>
+          </a:lnRef>
+          <a:fillRef idx="0">
+            <a:schemeClr val="accent1"/>
+          </a:fillRef>
+          <a:effectRef idx="1">
+            <a:schemeClr val="accent1"/>
+          </a:effectRef>
+          <a:fontRef idx="minor">
+            <a:schemeClr val="tx1"/>
+          </a:fontRef>
+        </p:style>
+      </p:cxnSp>
+      <p:cxnSp>
+        <p:nvCxnSpPr>
+          <p:cNvPr id="23" name="Straight Connector 22"/>
+          <p:cNvCxnSpPr/>
+          <p:nvPr/>
+        </p:nvCxnSpPr>
+        <p:spPr>
+          <a:xfrm>
+            <a:off x="8502650" y="7280275"/>
+            <a:ext cx="136525" cy="133350"/>
+          </a:xfrm>
+          <a:prstGeom prst="line">
+            <a:avLst/>
+          </a:prstGeom>
+          <a:ln w="57150" cmpd="sng">
+            <a:solidFill>
+              <a:schemeClr val="bg1"/>
+            </a:solidFill>
+          </a:ln>
+          <a:effectLst/>
+        </p:spPr>
+        <p:style>
+          <a:lnRef idx="2">
+            <a:schemeClr val="accent1"/>
+          </a:lnRef>
+          <a:fillRef idx="0">
+            <a:schemeClr val="accent1"/>
+          </a:fillRef>
+          <a:effectRef idx="1">
+            <a:schemeClr val="accent1"/>
+          </a:effectRef>
+          <a:fontRef idx="minor">
+            <a:schemeClr val="tx1"/>
+          </a:fontRef>
+        </p:style>
+      </p:cxnSp>
     </p:spTree>
     <p:extLst>
       <p:ext uri="{BB962C8B-B14F-4D97-AF65-F5344CB8AC3E}">

</xml_diff>